<commit_message>
tiny fix for dpp
</commit_message>
<xml_diff>
--- a/vmemL1Bank/vmem_l1_bank.pptx
+++ b/vmemL1Bank/vmem_l1_bank.pptx
@@ -364,7 +364,7 @@
               <a:pPr>
                 <a:defRPr/>
               </a:pPr>
-              <a:t>9/2/2020</a:t>
+              <a:t>9/29/2020</a:t>
             </a:fld>
             <a:endParaRPr lang="en-US"/>
           </a:p>
@@ -583,7 +583,7 @@
               <a:pPr>
                 <a:defRPr/>
               </a:pPr>
-              <a:t>9/2/2020</a:t>
+              <a:t>9/29/2020</a:t>
             </a:fld>
             <a:endParaRPr lang="en-US"/>
           </a:p>
@@ -12041,6 +12041,15 @@
 </file>
 
 <file path=customXml/item1.xml><?xml version="1.0" encoding="utf-8"?>
+<?mso-contentType ?>
+<FormTemplates xmlns="http://schemas.microsoft.com/sharepoint/v3/contenttype/forms">
+  <Display>DocumentLibraryForm</Display>
+  <Edit>DocumentLibraryForm</Edit>
+  <New>DocumentLibraryForm</New>
+</FormTemplates>
+</file>
+
+<file path=customXml/item2.xml><?xml version="1.0" encoding="utf-8"?>
 <ct:contentTypeSchema xmlns:ct="http://schemas.microsoft.com/office/2006/metadata/contentType" xmlns:ma="http://schemas.microsoft.com/office/2006/metadata/properties/metaAttributes" ct:_="" ma:_="" ma:contentTypeName="Document" ma:contentTypeID="0x010100B040F28C9190714F9051F1661A72B344" ma:contentTypeVersion="0" ma:contentTypeDescription="Create a new document." ma:contentTypeScope="" ma:versionID="b8b95d69f10381dae1e3fc8aa097d9b2">
   <xsd:schema xmlns:xsd="http://www.w3.org/2001/XMLSchema" xmlns:xs="http://www.w3.org/2001/XMLSchema" xmlns:p="http://schemas.microsoft.com/office/2006/metadata/properties" targetNamespace="http://schemas.microsoft.com/office/2006/metadata/properties" ma:root="true" ma:fieldsID="1b05d82d297216baf5b26c55225140df">
     <xsd:element name="properties">
@@ -12154,16 +12163,15 @@
 </ct:contentTypeSchema>
 </file>
 
-<file path=customXml/item2.xml><?xml version="1.0" encoding="utf-8"?>
-<?mso-contentType ?>
-<FormTemplates xmlns="http://schemas.microsoft.com/sharepoint/v3/contenttype/forms">
-  <Display>DocumentLibraryForm</Display>
-  <Edit>DocumentLibraryForm</Edit>
-  <New>DocumentLibraryForm</New>
-</FormTemplates>
+<file path=customXml/itemProps1.xml><?xml version="1.0" encoding="utf-8"?>
+<ds:datastoreItem xmlns:ds="http://schemas.openxmlformats.org/officeDocument/2006/customXml" ds:itemID="{46C7C7BA-398C-443C-9325-A8C61CE3C0A0}">
+  <ds:schemaRefs>
+    <ds:schemaRef ds:uri="http://schemas.microsoft.com/sharepoint/v3/contenttype/forms"/>
+  </ds:schemaRefs>
+</ds:datastoreItem>
 </file>
 
-<file path=customXml/itemProps1.xml><?xml version="1.0" encoding="utf-8"?>
+<file path=customXml/itemProps2.xml><?xml version="1.0" encoding="utf-8"?>
 <ds:datastoreItem xmlns:ds="http://schemas.openxmlformats.org/officeDocument/2006/customXml" ds:itemID="{CB9B9DAE-0203-490A-8CF8-6A331C5A0B02}">
   <ds:schemaRefs>
     <ds:schemaRef ds:uri="http://schemas.microsoft.com/office/2006/metadata/contentType"/>
@@ -12177,12 +12185,4 @@
     <ds:schemaRef ds:uri="http://schemas.microsoft.com/office/infopath/2007/PartnerControls"/>
   </ds:schemaRefs>
 </ds:datastoreItem>
-</file>
-
-<file path=customXml/itemProps2.xml><?xml version="1.0" encoding="utf-8"?>
-<ds:datastoreItem xmlns:ds="http://schemas.openxmlformats.org/officeDocument/2006/customXml" ds:itemID="{46C7C7BA-398C-443C-9325-A8C61CE3C0A0}">
-  <ds:schemaRefs>
-    <ds:schemaRef ds:uri="http://schemas.microsoft.com/sharepoint/v3/contenttype/forms"/>
-  </ds:schemaRefs>
-</ds:datastoreItem>
 </file>
</xml_diff>